<commit_message>
Changing all the files
Changing all the required files for submission.
</commit_message>
<xml_diff>
--- a/Final_presentation.pptx
+++ b/Final_presentation.pptx
@@ -271,7 +271,7 @@
   </p:defaultTextStyle>
   <p:extLst>
     <p:ext uri="GoogleSlidesCustomDataVersion2">
-      <go:slidesCustomData xmlns:go="http://customooxmlschemas.google.com/" r:id="rId26" roundtripDataSignature="AMtx7mgL+AwZctpjecM9J1G1429GZA5YKg=="/>
+      <go:slidesCustomData xmlns:go="http://customooxmlschemas.google.com/" r:id="rId26" roundtripDataSignature="AMtx7mhN/C/ChzOeRB+CVuyYSsJs48fdWQ=="/>
     </p:ext>
   </p:extLst>
 </p:presentation>
@@ -1118,7 +1118,7 @@
       </p:grpSpPr>
       <p:sp>
         <p:nvSpPr>
-          <p:cNvPr id="137" name="Google Shape;137;g31898b522ba_2_4:notes"/>
+          <p:cNvPr id="137" name="Google Shape;137;g31898b522ba_2_9:notes"/>
           <p:cNvSpPr txBox="1"/>
           <p:nvPr>
             <p:ph idx="1" type="body"/>
@@ -1157,7 +1157,7 @@
       </p:sp>
       <p:sp>
         <p:nvSpPr>
-          <p:cNvPr id="138" name="Google Shape;138;g31898b522ba_2_4:notes"/>
+          <p:cNvPr id="138" name="Google Shape;138;g31898b522ba_2_9:notes"/>
           <p:cNvSpPr/>
           <p:nvPr>
             <p:ph idx="2" type="sldImg"/>
@@ -1217,7 +1217,7 @@
       </p:grpSpPr>
       <p:sp>
         <p:nvSpPr>
-          <p:cNvPr id="143" name="Google Shape;143;g31898b522ba_2_9:notes"/>
+          <p:cNvPr id="143" name="Google Shape;143;g31898b522ba_2_4:notes"/>
           <p:cNvSpPr txBox="1"/>
           <p:nvPr>
             <p:ph idx="1" type="body"/>
@@ -1256,7 +1256,7 @@
       </p:sp>
       <p:sp>
         <p:nvSpPr>
-          <p:cNvPr id="144" name="Google Shape;144;g31898b522ba_2_9:notes"/>
+          <p:cNvPr id="144" name="Google Shape;144;g31898b522ba_2_4:notes"/>
           <p:cNvSpPr/>
           <p:nvPr>
             <p:ph idx="2" type="sldImg"/>
@@ -1302,7 +1302,7 @@
   <p:cSld>
     <p:spTree>
       <p:nvGrpSpPr>
-        <p:cNvPr id="148" name="Shape 148"/>
+        <p:cNvPr id="152" name="Shape 152"/>
         <p:cNvGrpSpPr/>
         <p:nvPr/>
       </p:nvGrpSpPr>
@@ -1316,7 +1316,7 @@
       </p:grpSpPr>
       <p:sp>
         <p:nvSpPr>
-          <p:cNvPr id="149" name="Google Shape;149;p12:notes"/>
+          <p:cNvPr id="153" name="Google Shape;153;p12:notes"/>
           <p:cNvSpPr txBox="1"/>
           <p:nvPr>
             <p:ph idx="1" type="body"/>
@@ -1355,7 +1355,7 @@
       </p:sp>
       <p:sp>
         <p:nvSpPr>
-          <p:cNvPr id="150" name="Google Shape;150;p12:notes"/>
+          <p:cNvPr id="154" name="Google Shape;154;p12:notes"/>
           <p:cNvSpPr/>
           <p:nvPr>
             <p:ph idx="2" type="sldImg"/>
@@ -1401,7 +1401,7 @@
   <p:cSld>
     <p:spTree>
       <p:nvGrpSpPr>
-        <p:cNvPr id="154" name="Shape 154"/>
+        <p:cNvPr id="158" name="Shape 158"/>
         <p:cNvGrpSpPr/>
         <p:nvPr/>
       </p:nvGrpSpPr>
@@ -1415,7 +1415,7 @@
       </p:grpSpPr>
       <p:sp>
         <p:nvSpPr>
-          <p:cNvPr id="155" name="Google Shape;155;p13:notes"/>
+          <p:cNvPr id="159" name="Google Shape;159;p13:notes"/>
           <p:cNvSpPr txBox="1"/>
           <p:nvPr>
             <p:ph idx="1" type="body"/>
@@ -1454,7 +1454,7 @@
       </p:sp>
       <p:sp>
         <p:nvSpPr>
-          <p:cNvPr id="156" name="Google Shape;156;p13:notes"/>
+          <p:cNvPr id="160" name="Google Shape;160;p13:notes"/>
           <p:cNvSpPr/>
           <p:nvPr>
             <p:ph idx="2" type="sldImg"/>
@@ -1500,7 +1500,7 @@
   <p:cSld>
     <p:spTree>
       <p:nvGrpSpPr>
-        <p:cNvPr id="160" name="Shape 160"/>
+        <p:cNvPr id="164" name="Shape 164"/>
         <p:cNvGrpSpPr/>
         <p:nvPr/>
       </p:nvGrpSpPr>
@@ -1514,7 +1514,7 @@
       </p:grpSpPr>
       <p:sp>
         <p:nvSpPr>
-          <p:cNvPr id="161" name="Google Shape;161;p14:notes"/>
+          <p:cNvPr id="165" name="Google Shape;165;p14:notes"/>
           <p:cNvSpPr txBox="1"/>
           <p:nvPr>
             <p:ph idx="1" type="body"/>
@@ -1553,7 +1553,7 @@
       </p:sp>
       <p:sp>
         <p:nvSpPr>
-          <p:cNvPr id="162" name="Google Shape;162;p14:notes"/>
+          <p:cNvPr id="166" name="Google Shape;166;p14:notes"/>
           <p:cNvSpPr/>
           <p:nvPr>
             <p:ph idx="2" type="sldImg"/>
@@ -1599,7 +1599,7 @@
   <p:cSld>
     <p:spTree>
       <p:nvGrpSpPr>
-        <p:cNvPr id="166" name="Shape 166"/>
+        <p:cNvPr id="170" name="Shape 170"/>
         <p:cNvGrpSpPr/>
         <p:nvPr/>
       </p:nvGrpSpPr>
@@ -1613,7 +1613,7 @@
       </p:grpSpPr>
       <p:sp>
         <p:nvSpPr>
-          <p:cNvPr id="167" name="Google Shape;167;p15:notes"/>
+          <p:cNvPr id="171" name="Google Shape;171;p15:notes"/>
           <p:cNvSpPr txBox="1"/>
           <p:nvPr>
             <p:ph idx="1" type="body"/>
@@ -1652,7 +1652,7 @@
       </p:sp>
       <p:sp>
         <p:nvSpPr>
-          <p:cNvPr id="168" name="Google Shape;168;p15:notes"/>
+          <p:cNvPr id="172" name="Google Shape;172;p15:notes"/>
           <p:cNvSpPr/>
           <p:nvPr>
             <p:ph idx="2" type="sldImg"/>
@@ -8306,7 +8306,7 @@
             </a:pPr>
             <a:r>
               <a:rPr lang="en-US" sz="2400"/>
-              <a:t>Accuracy (66%)</a:t>
+              <a:t>Accuracy (74%)</a:t>
             </a:r>
             <a:endParaRPr sz="2400"/>
           </a:p>
@@ -8323,7 +8323,7 @@
             </a:pPr>
             <a:r>
               <a:rPr lang="en-US" sz="2400"/>
-              <a:t>Precision (66%)</a:t>
+              <a:t>Precision (74%)</a:t>
             </a:r>
             <a:endParaRPr sz="2400"/>
           </a:p>
@@ -8340,7 +8340,7 @@
             </a:pPr>
             <a:r>
               <a:rPr lang="en-US" sz="2400"/>
-              <a:t>Recall (66%)</a:t>
+              <a:t>Recall (74%)</a:t>
             </a:r>
             <a:endParaRPr sz="2400"/>
           </a:p>
@@ -8357,7 +8357,7 @@
             </a:pPr>
             <a:r>
               <a:rPr lang="en-US" sz="2400"/>
-              <a:t>F1 Score (66%).</a:t>
+              <a:t>F1 Score (74%).</a:t>
             </a:r>
             <a:endParaRPr sz="2400"/>
           </a:p>
@@ -8930,7 +8930,7 @@
       </p:grpSpPr>
       <p:sp>
         <p:nvSpPr>
-          <p:cNvPr id="140" name="Google Shape;140;g31898b522ba_2_4"/>
+          <p:cNvPr id="140" name="Google Shape;140;g31898b522ba_2_9"/>
           <p:cNvSpPr txBox="1"/>
           <p:nvPr>
             <p:ph type="title"/>
@@ -8971,7 +8971,7 @@
             </a:pPr>
             <a:r>
               <a:rPr lang="en-US"/>
-              <a:t>Results II: Random Forest</a:t>
+              <a:t>Results II: K-Nearest Neighbors </a:t>
             </a:r>
             <a:endParaRPr/>
           </a:p>
@@ -8979,7 +8979,7 @@
       </p:sp>
       <p:sp>
         <p:nvSpPr>
-          <p:cNvPr id="141" name="Google Shape;141;g31898b522ba_2_4"/>
+          <p:cNvPr id="141" name="Google Shape;141;g31898b522ba_2_9"/>
           <p:cNvSpPr txBox="1"/>
           <p:nvPr>
             <p:ph idx="1" type="body"/>
@@ -9083,7 +9083,7 @@
       </p:grpSpPr>
       <p:sp>
         <p:nvSpPr>
-          <p:cNvPr id="146" name="Google Shape;146;g31898b522ba_2_9"/>
+          <p:cNvPr id="146" name="Google Shape;146;g31898b522ba_2_4"/>
           <p:cNvSpPr txBox="1"/>
           <p:nvPr>
             <p:ph type="title"/>
@@ -9124,7 +9124,7 @@
             </a:pPr>
             <a:r>
               <a:rPr lang="en-US"/>
-              <a:t>Results III: K-Nearest Neighbors </a:t>
+              <a:t>Results III: Random Forest</a:t>
             </a:r>
             <a:endParaRPr/>
           </a:p>
@@ -9132,7 +9132,332 @@
       </p:sp>
       <p:sp>
         <p:nvSpPr>
-          <p:cNvPr id="147" name="Google Shape;147;g31898b522ba_2_9"/>
+          <p:cNvPr id="147" name="Google Shape;147;g31898b522ba_2_4"/>
+          <p:cNvSpPr txBox="1"/>
+          <p:nvPr>
+            <p:ph idx="1" type="body"/>
+          </p:nvPr>
+        </p:nvSpPr>
+        <p:spPr>
+          <a:xfrm>
+            <a:off x="415600" y="1550758"/>
+            <a:ext cx="11360700" cy="4555200"/>
+          </a:xfrm>
+          <a:prstGeom prst="rect">
+            <a:avLst/>
+          </a:prstGeom>
+          <a:noFill/>
+          <a:ln>
+            <a:noFill/>
+          </a:ln>
+        </p:spPr>
+        <p:txBody>
+          <a:bodyPr anchorCtr="0" anchor="t" bIns="45700" lIns="91425" spcFirstLastPara="1" rIns="91425" wrap="square" tIns="45700">
+            <a:normAutofit/>
+          </a:bodyPr>
+          <a:lstStyle/>
+          <a:p>
+            <a:pPr indent="-342900" lvl="0" marL="342900" rtl="0" algn="l">
+              <a:spcBef>
+                <a:spcPts val="0"/>
+              </a:spcBef>
+              <a:spcAft>
+                <a:spcPts val="0"/>
+              </a:spcAft>
+              <a:buSzPts val="1600"/>
+              <a:buChar char="●"/>
+            </a:pPr>
+            <a:r>
+              <a:rPr lang="en-US"/>
+              <a:t>Feature Importance: seatsRemaining, totalTravelDistance.</a:t>
+            </a:r>
+            <a:endParaRPr/>
+          </a:p>
+          <a:p>
+            <a:pPr indent="-342900" lvl="0" marL="342900" rtl="0" algn="l">
+              <a:spcBef>
+                <a:spcPts val="1000"/>
+              </a:spcBef>
+              <a:spcAft>
+                <a:spcPts val="0"/>
+              </a:spcAft>
+              <a:buSzPts val="1600"/>
+              <a:buChar char="●"/>
+            </a:pPr>
+            <a:r>
+              <a:rPr lang="en-US"/>
+              <a:t>Confusion Matrix: Performance across price categories.</a:t>
+            </a:r>
+            <a:endParaRPr/>
+          </a:p>
+          <a:p>
+            <a:pPr indent="-393700" lvl="0" marL="342900" rtl="0" algn="l">
+              <a:spcBef>
+                <a:spcPts val="1000"/>
+              </a:spcBef>
+              <a:spcAft>
+                <a:spcPts val="0"/>
+              </a:spcAft>
+              <a:buSzPts val="2400"/>
+              <a:buChar char="●"/>
+            </a:pPr>
+            <a:r>
+              <a:rPr lang="en-US"/>
+              <a:t>Comparing the results of three models, Decision Tree provides the best results</a:t>
+            </a:r>
+            <a:endParaRPr/>
+          </a:p>
+        </p:txBody>
+      </p:sp>
+      <p:sp>
+        <p:nvSpPr>
+          <p:cNvPr id="148" name="Google Shape;148;g31898b522ba_2_4"/>
+          <p:cNvSpPr txBox="1"/>
+          <p:nvPr/>
+        </p:nvSpPr>
+        <p:spPr>
+          <a:xfrm>
+            <a:off x="667425" y="6170775"/>
+            <a:ext cx="5361900" cy="353400"/>
+          </a:xfrm>
+          <a:prstGeom prst="rect">
+            <a:avLst/>
+          </a:prstGeom>
+          <a:noFill/>
+          <a:ln>
+            <a:noFill/>
+          </a:ln>
+        </p:spPr>
+        <p:txBody>
+          <a:bodyPr anchorCtr="0" anchor="t" bIns="91425" lIns="91425" spcFirstLastPara="1" rIns="91425" wrap="square" tIns="91425">
+            <a:noAutofit/>
+          </a:bodyPr>
+          <a:lstStyle/>
+          <a:p>
+            <a:pPr indent="0" lvl="0" marL="0" rtl="0" algn="l">
+              <a:spcBef>
+                <a:spcPts val="0"/>
+              </a:spcBef>
+              <a:spcAft>
+                <a:spcPts val="0"/>
+              </a:spcAft>
+              <a:buNone/>
+            </a:pPr>
+            <a:r>
+              <a:rPr lang="en-US" sz="2400">
+                <a:solidFill>
+                  <a:schemeClr val="accent3"/>
+                </a:solidFill>
+                <a:latin typeface="Average"/>
+                <a:ea typeface="Average"/>
+                <a:cs typeface="Average"/>
+                <a:sym typeface="Average"/>
+              </a:rPr>
+              <a:t>Figure 1: Feature Importance Diagram</a:t>
+            </a:r>
+            <a:endParaRPr sz="2400">
+              <a:solidFill>
+                <a:schemeClr val="accent3"/>
+              </a:solidFill>
+              <a:latin typeface="Average"/>
+              <a:ea typeface="Average"/>
+              <a:cs typeface="Average"/>
+              <a:sym typeface="Average"/>
+            </a:endParaRPr>
+          </a:p>
+        </p:txBody>
+      </p:sp>
+      <p:sp>
+        <p:nvSpPr>
+          <p:cNvPr id="149" name="Google Shape;149;g31898b522ba_2_4"/>
+          <p:cNvSpPr txBox="1"/>
+          <p:nvPr/>
+        </p:nvSpPr>
+        <p:spPr>
+          <a:xfrm>
+            <a:off x="6662875" y="6299825"/>
+            <a:ext cx="4892400" cy="554100"/>
+          </a:xfrm>
+          <a:prstGeom prst="rect">
+            <a:avLst/>
+          </a:prstGeom>
+          <a:noFill/>
+          <a:ln>
+            <a:noFill/>
+          </a:ln>
+        </p:spPr>
+        <p:txBody>
+          <a:bodyPr anchorCtr="0" anchor="t" bIns="91425" lIns="91425" spcFirstLastPara="1" rIns="91425" wrap="square" tIns="91425">
+            <a:spAutoFit/>
+          </a:bodyPr>
+          <a:lstStyle/>
+          <a:p>
+            <a:pPr indent="0" lvl="0" marL="0" rtl="0" algn="l">
+              <a:spcBef>
+                <a:spcPts val="0"/>
+              </a:spcBef>
+              <a:spcAft>
+                <a:spcPts val="0"/>
+              </a:spcAft>
+              <a:buNone/>
+            </a:pPr>
+            <a:r>
+              <a:rPr lang="en-US" sz="2400">
+                <a:solidFill>
+                  <a:schemeClr val="accent3"/>
+                </a:solidFill>
+                <a:latin typeface="Average"/>
+                <a:ea typeface="Average"/>
+                <a:cs typeface="Average"/>
+                <a:sym typeface="Average"/>
+              </a:rPr>
+              <a:t>Figure 2: Confusion Matrix Diagram</a:t>
+            </a:r>
+            <a:endParaRPr sz="2400">
+              <a:solidFill>
+                <a:schemeClr val="accent3"/>
+              </a:solidFill>
+              <a:latin typeface="Average"/>
+              <a:ea typeface="Average"/>
+              <a:cs typeface="Average"/>
+              <a:sym typeface="Average"/>
+            </a:endParaRPr>
+          </a:p>
+        </p:txBody>
+      </p:sp>
+      <p:pic>
+        <p:nvPicPr>
+          <p:cNvPr id="150" name="Google Shape;150;g31898b522ba_2_4"/>
+          <p:cNvPicPr preferRelativeResize="0"/>
+          <p:nvPr/>
+        </p:nvPicPr>
+        <p:blipFill>
+          <a:blip r:embed="rId3">
+            <a:alphaModFix/>
+          </a:blip>
+          <a:stretch>
+            <a:fillRect/>
+          </a:stretch>
+        </p:blipFill>
+        <p:spPr>
+          <a:xfrm>
+            <a:off x="376575" y="3242800"/>
+            <a:ext cx="6286299" cy="2927975"/>
+          </a:xfrm>
+          <a:prstGeom prst="rect">
+            <a:avLst/>
+          </a:prstGeom>
+          <a:noFill/>
+          <a:ln>
+            <a:noFill/>
+          </a:ln>
+        </p:spPr>
+      </p:pic>
+      <p:pic>
+        <p:nvPicPr>
+          <p:cNvPr id="151" name="Google Shape;151;g31898b522ba_2_4"/>
+          <p:cNvPicPr preferRelativeResize="0"/>
+          <p:nvPr/>
+        </p:nvPicPr>
+        <p:blipFill>
+          <a:blip r:embed="rId4">
+            <a:alphaModFix/>
+          </a:blip>
+          <a:stretch>
+            <a:fillRect/>
+          </a:stretch>
+        </p:blipFill>
+        <p:spPr>
+          <a:xfrm>
+            <a:off x="6774725" y="3117782"/>
+            <a:ext cx="4780550" cy="3182043"/>
+          </a:xfrm>
+          <a:prstGeom prst="rect">
+            <a:avLst/>
+          </a:prstGeom>
+          <a:noFill/>
+          <a:ln>
+            <a:noFill/>
+          </a:ln>
+        </p:spPr>
+      </p:pic>
+    </p:spTree>
+  </p:cSld>
+  <p:clrMapOvr>
+    <a:masterClrMapping/>
+  </p:clrMapOvr>
+</p:sld>
+</file>
+
+<file path=ppt/slides/slide15.xml><?xml version="1.0" encoding="utf-8"?>
+<p:sld xmlns:a="http://schemas.openxmlformats.org/drawingml/2006/main" xmlns:r="http://schemas.openxmlformats.org/officeDocument/2006/relationships" xmlns:mc="http://schemas.openxmlformats.org/markup-compatibility/2006" xmlns:mv="urn:schemas-microsoft-com:mac:vml" xmlns:p="http://schemas.openxmlformats.org/presentationml/2006/main" xmlns:c="http://schemas.openxmlformats.org/drawingml/2006/chart" xmlns:dgm="http://schemas.openxmlformats.org/drawingml/2006/diagram" xmlns:o="urn:schemas-microsoft-com:office:office" xmlns:v="urn:schemas-microsoft-com:vml" xmlns:pvml="urn:schemas-microsoft-com:office:powerpoint" xmlns:com="http://schemas.openxmlformats.org/drawingml/2006/compatibility" xmlns:p14="http://schemas.microsoft.com/office/powerpoint/2010/main" xmlns:p15="http://schemas.microsoft.com/office/powerpoint/2012/main" xmlns:ahyp="http://schemas.microsoft.com/office/drawing/2018/hyperlinkcolor">
+  <p:cSld>
+    <p:spTree>
+      <p:nvGrpSpPr>
+        <p:cNvPr id="155" name="Shape 155"/>
+        <p:cNvGrpSpPr/>
+        <p:nvPr/>
+      </p:nvGrpSpPr>
+      <p:grpSpPr>
+        <a:xfrm>
+          <a:off x="0" y="0"/>
+          <a:ext cx="0" cy="0"/>
+          <a:chOff x="0" y="0"/>
+          <a:chExt cx="0" cy="0"/>
+        </a:xfrm>
+      </p:grpSpPr>
+      <p:sp>
+        <p:nvSpPr>
+          <p:cNvPr id="156" name="Google Shape;156;p12"/>
+          <p:cNvSpPr txBox="1"/>
+          <p:nvPr>
+            <p:ph type="title"/>
+          </p:nvPr>
+        </p:nvSpPr>
+        <p:spPr>
+          <a:xfrm>
+            <a:off x="415600" y="593367"/>
+            <a:ext cx="11360700" cy="763500"/>
+          </a:xfrm>
+          <a:prstGeom prst="rect">
+            <a:avLst/>
+          </a:prstGeom>
+          <a:noFill/>
+          <a:ln>
+            <a:noFill/>
+          </a:ln>
+        </p:spPr>
+        <p:txBody>
+          <a:bodyPr anchorCtr="0" anchor="t" bIns="45700" lIns="91425" spcFirstLastPara="1" rIns="91425" wrap="square" tIns="45700">
+            <a:noAutofit/>
+          </a:bodyPr>
+          <a:lstStyle/>
+          <a:p>
+            <a:pPr indent="0" lvl="0" marL="0" rtl="0" algn="l">
+              <a:spcBef>
+                <a:spcPts val="0"/>
+              </a:spcBef>
+              <a:spcAft>
+                <a:spcPts val="0"/>
+              </a:spcAft>
+              <a:buClr>
+                <a:schemeClr val="lt2"/>
+              </a:buClr>
+              <a:buSzPts val="4200"/>
+              <a:buFont typeface="Century Gothic"/>
+              <a:buNone/>
+            </a:pPr>
+            <a:r>
+              <a:rPr lang="en-US"/>
+              <a:t>Discussion</a:t>
+            </a:r>
+            <a:endParaRPr/>
+          </a:p>
+        </p:txBody>
+      </p:sp>
+      <p:sp>
+        <p:nvSpPr>
+          <p:cNvPr id="157" name="Google Shape;157;p12"/>
           <p:cNvSpPr txBox="1"/>
           <p:nvPr>
             <p:ph idx="1" type="body"/>
@@ -9169,7 +9494,15 @@
             </a:pPr>
             <a:r>
               <a:rPr lang="en-US"/>
-              <a:t>Feature Importance: seatsRemaining, totalTravelDistance.</a:t>
+              <a:t>Insights: Key features influencing flight prices are total travel </a:t>
+            </a:r>
+            <a:r>
+              <a:rPr lang="en-US"/>
+              <a:t>distance</a:t>
+            </a:r>
+            <a:r>
+              <a:rPr lang="en-US"/>
+              <a:t>, days before the flight, and is basic economy</a:t>
             </a:r>
             <a:endParaRPr/>
           </a:p>
@@ -9186,24 +9519,24 @@
             </a:pPr>
             <a:r>
               <a:rPr lang="en-US"/>
-              <a:t>Confusion Matrix: Performance across price categories.</a:t>
+              <a:t>Challenges: Balancing class distributions, tuning model parameters.</a:t>
             </a:r>
             <a:endParaRPr/>
           </a:p>
           <a:p>
-            <a:pPr indent="-393700" lvl="0" marL="342900" rtl="0" algn="l">
+            <a:pPr indent="-342900" lvl="0" marL="342900" rtl="0" algn="l">
               <a:spcBef>
                 <a:spcPts val="1000"/>
               </a:spcBef>
               <a:spcAft>
                 <a:spcPts val="0"/>
               </a:spcAft>
-              <a:buSzPts val="2400"/>
+              <a:buSzPts val="1600"/>
               <a:buChar char="●"/>
             </a:pPr>
             <a:r>
               <a:rPr lang="en-US"/>
-              <a:t>Comparing the results of three models, Decision Tree provides the best results</a:t>
+              <a:t>Future Improvements: Additional features, ensemble techniques.</a:t>
             </a:r>
             <a:endParaRPr/>
           </a:p>
@@ -9217,12 +9550,12 @@
 </p:sld>
 </file>
 
-<file path=ppt/slides/slide15.xml><?xml version="1.0" encoding="utf-8"?>
+<file path=ppt/slides/slide16.xml><?xml version="1.0" encoding="utf-8"?>
 <p:sld xmlns:a="http://schemas.openxmlformats.org/drawingml/2006/main" xmlns:r="http://schemas.openxmlformats.org/officeDocument/2006/relationships" xmlns:mc="http://schemas.openxmlformats.org/markup-compatibility/2006" xmlns:mv="urn:schemas-microsoft-com:mac:vml" xmlns:p="http://schemas.openxmlformats.org/presentationml/2006/main" xmlns:c="http://schemas.openxmlformats.org/drawingml/2006/chart" xmlns:dgm="http://schemas.openxmlformats.org/drawingml/2006/diagram" xmlns:o="urn:schemas-microsoft-com:office:office" xmlns:v="urn:schemas-microsoft-com:vml" xmlns:pvml="urn:schemas-microsoft-com:office:powerpoint" xmlns:com="http://schemas.openxmlformats.org/drawingml/2006/compatibility" xmlns:p14="http://schemas.microsoft.com/office/powerpoint/2010/main" xmlns:p15="http://schemas.microsoft.com/office/powerpoint/2012/main" xmlns:ahyp="http://schemas.microsoft.com/office/drawing/2018/hyperlinkcolor">
   <p:cSld>
     <p:spTree>
       <p:nvGrpSpPr>
-        <p:cNvPr id="151" name="Shape 151"/>
+        <p:cNvPr id="161" name="Shape 161"/>
         <p:cNvGrpSpPr/>
         <p:nvPr/>
       </p:nvGrpSpPr>
@@ -9236,7 +9569,7 @@
       </p:grpSpPr>
       <p:sp>
         <p:nvSpPr>
-          <p:cNvPr id="152" name="Google Shape;152;p12"/>
+          <p:cNvPr id="162" name="Google Shape;162;p13"/>
           <p:cNvSpPr txBox="1"/>
           <p:nvPr>
             <p:ph type="title"/>
@@ -9277,7 +9610,7 @@
             </a:pPr>
             <a:r>
               <a:rPr lang="en-US"/>
-              <a:t>Discussion</a:t>
+              <a:t>Conclusion</a:t>
             </a:r>
             <a:endParaRPr/>
           </a:p>
@@ -9285,7 +9618,7 @@
       </p:sp>
       <p:sp>
         <p:nvSpPr>
-          <p:cNvPr id="153" name="Google Shape;153;p12"/>
+          <p:cNvPr id="163" name="Google Shape;163;p13"/>
           <p:cNvSpPr txBox="1"/>
           <p:nvPr>
             <p:ph idx="1" type="body"/>
@@ -9322,15 +9655,7 @@
             </a:pPr>
             <a:r>
               <a:rPr lang="en-US"/>
-              <a:t>Insights: Key features influencing flight prices are total travel </a:t>
-            </a:r>
-            <a:r>
-              <a:rPr lang="en-US"/>
-              <a:t>distance</a:t>
-            </a:r>
-            <a:r>
-              <a:rPr lang="en-US"/>
-              <a:t>, days before the flight, and is basic economy</a:t>
+              <a:t>Summary: Effective classification of flight prices into ranges.</a:t>
             </a:r>
             <a:endParaRPr/>
           </a:p>
@@ -9347,7 +9672,7 @@
             </a:pPr>
             <a:r>
               <a:rPr lang="en-US"/>
-              <a:t>Challenges: Balancing class distributions, tuning model parameters.</a:t>
+              <a:t>Impact: Insights for travelers and industry.</a:t>
             </a:r>
             <a:endParaRPr/>
           </a:p>
@@ -9364,7 +9689,7 @@
             </a:pPr>
             <a:r>
               <a:rPr lang="en-US"/>
-              <a:t>Future Improvements: Additional features, ensemble techniques.</a:t>
+              <a:t>Future Scope: Real-time predictions, advanced models.</a:t>
             </a:r>
             <a:endParaRPr/>
           </a:p>
@@ -9378,12 +9703,12 @@
 </p:sld>
 </file>
 
-<file path=ppt/slides/slide16.xml><?xml version="1.0" encoding="utf-8"?>
+<file path=ppt/slides/slide17.xml><?xml version="1.0" encoding="utf-8"?>
 <p:sld xmlns:a="http://schemas.openxmlformats.org/drawingml/2006/main" xmlns:r="http://schemas.openxmlformats.org/officeDocument/2006/relationships" xmlns:mc="http://schemas.openxmlformats.org/markup-compatibility/2006" xmlns:mv="urn:schemas-microsoft-com:mac:vml" xmlns:p="http://schemas.openxmlformats.org/presentationml/2006/main" xmlns:c="http://schemas.openxmlformats.org/drawingml/2006/chart" xmlns:dgm="http://schemas.openxmlformats.org/drawingml/2006/diagram" xmlns:o="urn:schemas-microsoft-com:office:office" xmlns:v="urn:schemas-microsoft-com:vml" xmlns:pvml="urn:schemas-microsoft-com:office:powerpoint" xmlns:com="http://schemas.openxmlformats.org/drawingml/2006/compatibility" xmlns:p14="http://schemas.microsoft.com/office/powerpoint/2010/main" xmlns:p15="http://schemas.microsoft.com/office/powerpoint/2012/main" xmlns:ahyp="http://schemas.microsoft.com/office/drawing/2018/hyperlinkcolor">
   <p:cSld>
     <p:spTree>
       <p:nvGrpSpPr>
-        <p:cNvPr id="157" name="Shape 157"/>
+        <p:cNvPr id="167" name="Shape 167"/>
         <p:cNvGrpSpPr/>
         <p:nvPr/>
       </p:nvGrpSpPr>
@@ -9397,7 +9722,7 @@
       </p:grpSpPr>
       <p:sp>
         <p:nvSpPr>
-          <p:cNvPr id="158" name="Google Shape;158;p13"/>
+          <p:cNvPr id="168" name="Google Shape;168;p14"/>
           <p:cNvSpPr txBox="1"/>
           <p:nvPr>
             <p:ph type="title"/>
@@ -9438,7 +9763,7 @@
             </a:pPr>
             <a:r>
               <a:rPr lang="en-US"/>
-              <a:t>Conclusion</a:t>
+              <a:t>Project Plan &amp; Task Distribution</a:t>
             </a:r>
             <a:endParaRPr/>
           </a:p>
@@ -9446,7 +9771,7 @@
       </p:sp>
       <p:sp>
         <p:nvSpPr>
-          <p:cNvPr id="159" name="Google Shape;159;p13"/>
+          <p:cNvPr id="169" name="Google Shape;169;p14"/>
           <p:cNvSpPr txBox="1"/>
           <p:nvPr>
             <p:ph idx="1" type="body"/>
@@ -9454,7 +9779,7 @@
         </p:nvSpPr>
         <p:spPr>
           <a:xfrm>
-            <a:off x="415600" y="1536633"/>
+            <a:off x="415600" y="1612833"/>
             <a:ext cx="11360700" cy="4555200"/>
           </a:xfrm>
           <a:prstGeom prst="rect">
@@ -9471,55 +9796,94 @@
           </a:bodyPr>
           <a:lstStyle/>
           <a:p>
-            <a:pPr indent="-342900" lvl="0" marL="342900" rtl="0" algn="l">
-              <a:spcBef>
-                <a:spcPts val="0"/>
-              </a:spcBef>
-              <a:spcAft>
-                <a:spcPts val="0"/>
-              </a:spcAft>
-              <a:buSzPts val="1600"/>
+            <a:pPr indent="0" lvl="0" marL="0" rtl="0" algn="l">
+              <a:spcBef>
+                <a:spcPts val="0"/>
+              </a:spcBef>
+              <a:spcAft>
+                <a:spcPts val="0"/>
+              </a:spcAft>
+              <a:buNone/>
+            </a:pPr>
+            <a:r>
+              <a:rPr lang="en-US" sz="2500"/>
+              <a:t>We all worked on: data cleaning, feature engineering, data visualization,  evaluation metrics, report documentation, presentation preparation</a:t>
+            </a:r>
+            <a:endParaRPr sz="2500"/>
+          </a:p>
+          <a:p>
+            <a:pPr indent="0" lvl="0" marL="0" rtl="0" algn="l">
+              <a:spcBef>
+                <a:spcPts val="1000"/>
+              </a:spcBef>
+              <a:spcAft>
+                <a:spcPts val="0"/>
+              </a:spcAft>
+              <a:buNone/>
+            </a:pPr>
+            <a:r>
+              <a:t/>
+            </a:r>
+            <a:endParaRPr sz="2500"/>
+          </a:p>
+          <a:p>
+            <a:pPr indent="-349250" lvl="0" marL="342900" rtl="0" algn="l">
+              <a:spcBef>
+                <a:spcPts val="1000"/>
+              </a:spcBef>
+              <a:spcAft>
+                <a:spcPts val="0"/>
+              </a:spcAft>
+              <a:buSzPts val="1700"/>
               <a:buChar char="●"/>
             </a:pPr>
             <a:r>
-              <a:rPr lang="en-US"/>
-              <a:t>Summary: Effective classification of flight prices into ranges.</a:t>
-            </a:r>
-            <a:endParaRPr/>
-          </a:p>
-          <a:p>
-            <a:pPr indent="-342900" lvl="0" marL="342900" rtl="0" algn="l">
+              <a:rPr lang="en-US" sz="2500"/>
+              <a:t>Vivek Ponnala: Setting up github, CI and all the branches, implementing Random Forest Classifier, Presentation and Report</a:t>
+            </a:r>
+            <a:endParaRPr sz="2500"/>
+          </a:p>
+          <a:p>
+            <a:pPr indent="-349250" lvl="0" marL="342900" rtl="0" algn="l">
               <a:spcBef>
                 <a:spcPts val="1000"/>
               </a:spcBef>
               <a:spcAft>
                 <a:spcPts val="0"/>
               </a:spcAft>
-              <a:buSzPts val="1600"/>
+              <a:buSzPts val="1700"/>
               <a:buChar char="●"/>
             </a:pPr>
             <a:r>
-              <a:rPr lang="en-US"/>
-              <a:t>Impact: Insights for travelers and industry.</a:t>
-            </a:r>
-            <a:endParaRPr/>
-          </a:p>
-          <a:p>
-            <a:pPr indent="-342900" lvl="0" marL="342900" rtl="0" algn="l">
+              <a:rPr lang="en-US" sz="2500"/>
+              <a:t>Maggie Qin: </a:t>
+            </a:r>
+            <a:r>
+              <a:rPr lang="en-US" sz="2500">
+                <a:solidFill>
+                  <a:srgbClr val="CACACA"/>
+                </a:solidFill>
+              </a:rPr>
+              <a:t>K-Nearest Neighbors Classifier, Presentation and Report</a:t>
+            </a:r>
+            <a:endParaRPr sz="2500"/>
+          </a:p>
+          <a:p>
+            <a:pPr indent="-349250" lvl="0" marL="342900" rtl="0" algn="l">
               <a:spcBef>
                 <a:spcPts val="1000"/>
               </a:spcBef>
               <a:spcAft>
-                <a:spcPts val="0"/>
-              </a:spcAft>
-              <a:buSzPts val="1600"/>
+                <a:spcPts val="1000"/>
+              </a:spcAft>
+              <a:buSzPts val="1700"/>
               <a:buChar char="●"/>
             </a:pPr>
             <a:r>
-              <a:rPr lang="en-US"/>
-              <a:t>Future Scope: Real-time predictions, advanced models.</a:t>
-            </a:r>
-            <a:endParaRPr/>
+              <a:rPr lang="en-US" sz="2500"/>
+              <a:t>Hoai An Nguyen: Decision Tree Classifier, Presentation and Report</a:t>
+            </a:r>
+            <a:endParaRPr sz="2500"/>
           </a:p>
         </p:txBody>
       </p:sp>
@@ -9531,12 +9895,12 @@
 </p:sld>
 </file>
 
-<file path=ppt/slides/slide17.xml><?xml version="1.0" encoding="utf-8"?>
+<file path=ppt/slides/slide18.xml><?xml version="1.0" encoding="utf-8"?>
 <p:sld xmlns:a="http://schemas.openxmlformats.org/drawingml/2006/main" xmlns:r="http://schemas.openxmlformats.org/officeDocument/2006/relationships" xmlns:mc="http://schemas.openxmlformats.org/markup-compatibility/2006" xmlns:mv="urn:schemas-microsoft-com:mac:vml" xmlns:p="http://schemas.openxmlformats.org/presentationml/2006/main" xmlns:c="http://schemas.openxmlformats.org/drawingml/2006/chart" xmlns:dgm="http://schemas.openxmlformats.org/drawingml/2006/diagram" xmlns:o="urn:schemas-microsoft-com:office:office" xmlns:v="urn:schemas-microsoft-com:vml" xmlns:pvml="urn:schemas-microsoft-com:office:powerpoint" xmlns:com="http://schemas.openxmlformats.org/drawingml/2006/compatibility" xmlns:p14="http://schemas.microsoft.com/office/powerpoint/2010/main" xmlns:p15="http://schemas.microsoft.com/office/powerpoint/2012/main" xmlns:ahyp="http://schemas.microsoft.com/office/drawing/2018/hyperlinkcolor">
   <p:cSld>
     <p:spTree>
       <p:nvGrpSpPr>
-        <p:cNvPr id="163" name="Shape 163"/>
+        <p:cNvPr id="173" name="Shape 173"/>
         <p:cNvGrpSpPr/>
         <p:nvPr/>
       </p:nvGrpSpPr>
@@ -9550,7 +9914,7 @@
       </p:grpSpPr>
       <p:sp>
         <p:nvSpPr>
-          <p:cNvPr id="164" name="Google Shape;164;p14"/>
+          <p:cNvPr id="174" name="Google Shape;174;p15"/>
           <p:cNvSpPr txBox="1"/>
           <p:nvPr>
             <p:ph type="title"/>
@@ -9591,7 +9955,7 @@
             </a:pPr>
             <a:r>
               <a:rPr lang="en-US"/>
-              <a:t>Project Plan &amp; Task Distribution</a:t>
+              <a:t>References and Acknowledgments</a:t>
             </a:r>
             <a:endParaRPr/>
           </a:p>
@@ -9599,199 +9963,7 @@
       </p:sp>
       <p:sp>
         <p:nvSpPr>
-          <p:cNvPr id="165" name="Google Shape;165;p14"/>
-          <p:cNvSpPr txBox="1"/>
-          <p:nvPr>
-            <p:ph idx="1" type="body"/>
-          </p:nvPr>
-        </p:nvSpPr>
-        <p:spPr>
-          <a:xfrm>
-            <a:off x="415600" y="1612833"/>
-            <a:ext cx="11360700" cy="4555200"/>
-          </a:xfrm>
-          <a:prstGeom prst="rect">
-            <a:avLst/>
-          </a:prstGeom>
-          <a:noFill/>
-          <a:ln>
-            <a:noFill/>
-          </a:ln>
-        </p:spPr>
-        <p:txBody>
-          <a:bodyPr anchorCtr="0" anchor="t" bIns="45700" lIns="91425" spcFirstLastPara="1" rIns="91425" wrap="square" tIns="45700">
-            <a:normAutofit/>
-          </a:bodyPr>
-          <a:lstStyle/>
-          <a:p>
-            <a:pPr indent="0" lvl="0" marL="0" rtl="0" algn="l">
-              <a:spcBef>
-                <a:spcPts val="0"/>
-              </a:spcBef>
-              <a:spcAft>
-                <a:spcPts val="0"/>
-              </a:spcAft>
-              <a:buNone/>
-            </a:pPr>
-            <a:r>
-              <a:rPr lang="en-US" sz="2500"/>
-              <a:t>We all worked on: data cleaning, feature engineering, data visualization,  evaluation metrics, report documentation, presentation preparation</a:t>
-            </a:r>
-            <a:endParaRPr sz="2500"/>
-          </a:p>
-          <a:p>
-            <a:pPr indent="0" lvl="0" marL="0" rtl="0" algn="l">
-              <a:spcBef>
-                <a:spcPts val="1000"/>
-              </a:spcBef>
-              <a:spcAft>
-                <a:spcPts val="0"/>
-              </a:spcAft>
-              <a:buNone/>
-            </a:pPr>
-            <a:r>
-              <a:t/>
-            </a:r>
-            <a:endParaRPr sz="2500"/>
-          </a:p>
-          <a:p>
-            <a:pPr indent="-349250" lvl="0" marL="342900" rtl="0" algn="l">
-              <a:spcBef>
-                <a:spcPts val="1000"/>
-              </a:spcBef>
-              <a:spcAft>
-                <a:spcPts val="0"/>
-              </a:spcAft>
-              <a:buSzPts val="1700"/>
-              <a:buChar char="●"/>
-            </a:pPr>
-            <a:r>
-              <a:rPr lang="en-US" sz="2500"/>
-              <a:t>Vivek Ponnala: Setting up github, CI and all the branches, implementing Random Forest Classifier</a:t>
-            </a:r>
-            <a:endParaRPr sz="2500"/>
-          </a:p>
-          <a:p>
-            <a:pPr indent="-349250" lvl="0" marL="342900" rtl="0" algn="l">
-              <a:spcBef>
-                <a:spcPts val="1000"/>
-              </a:spcBef>
-              <a:spcAft>
-                <a:spcPts val="0"/>
-              </a:spcAft>
-              <a:buSzPts val="1700"/>
-              <a:buChar char="●"/>
-            </a:pPr>
-            <a:r>
-              <a:rPr lang="en-US" sz="2500"/>
-              <a:t>Maggie Qin: </a:t>
-            </a:r>
-            <a:r>
-              <a:rPr lang="en-US" sz="2500">
-                <a:solidFill>
-                  <a:srgbClr val="CACACA"/>
-                </a:solidFill>
-              </a:rPr>
-              <a:t>K-Nearest Neighbors Classifier</a:t>
-            </a:r>
-            <a:endParaRPr sz="2500"/>
-          </a:p>
-          <a:p>
-            <a:pPr indent="-349250" lvl="0" marL="342900" rtl="0" algn="l">
-              <a:spcBef>
-                <a:spcPts val="1000"/>
-              </a:spcBef>
-              <a:spcAft>
-                <a:spcPts val="1000"/>
-              </a:spcAft>
-              <a:buSzPts val="1700"/>
-              <a:buChar char="●"/>
-            </a:pPr>
-            <a:r>
-              <a:rPr lang="en-US" sz="2500"/>
-              <a:t>Hoai An Nguyen: Decision Tree Classifier</a:t>
-            </a:r>
-            <a:endParaRPr sz="2500"/>
-          </a:p>
-        </p:txBody>
-      </p:sp>
-    </p:spTree>
-  </p:cSld>
-  <p:clrMapOvr>
-    <a:masterClrMapping/>
-  </p:clrMapOvr>
-</p:sld>
-</file>
-
-<file path=ppt/slides/slide18.xml><?xml version="1.0" encoding="utf-8"?>
-<p:sld xmlns:a="http://schemas.openxmlformats.org/drawingml/2006/main" xmlns:r="http://schemas.openxmlformats.org/officeDocument/2006/relationships" xmlns:mc="http://schemas.openxmlformats.org/markup-compatibility/2006" xmlns:mv="urn:schemas-microsoft-com:mac:vml" xmlns:p="http://schemas.openxmlformats.org/presentationml/2006/main" xmlns:c="http://schemas.openxmlformats.org/drawingml/2006/chart" xmlns:dgm="http://schemas.openxmlformats.org/drawingml/2006/diagram" xmlns:o="urn:schemas-microsoft-com:office:office" xmlns:v="urn:schemas-microsoft-com:vml" xmlns:pvml="urn:schemas-microsoft-com:office:powerpoint" xmlns:com="http://schemas.openxmlformats.org/drawingml/2006/compatibility" xmlns:p14="http://schemas.microsoft.com/office/powerpoint/2010/main" xmlns:p15="http://schemas.microsoft.com/office/powerpoint/2012/main" xmlns:ahyp="http://schemas.microsoft.com/office/drawing/2018/hyperlinkcolor">
-  <p:cSld>
-    <p:spTree>
-      <p:nvGrpSpPr>
-        <p:cNvPr id="169" name="Shape 169"/>
-        <p:cNvGrpSpPr/>
-        <p:nvPr/>
-      </p:nvGrpSpPr>
-      <p:grpSpPr>
-        <a:xfrm>
-          <a:off x="0" y="0"/>
-          <a:ext cx="0" cy="0"/>
-          <a:chOff x="0" y="0"/>
-          <a:chExt cx="0" cy="0"/>
-        </a:xfrm>
-      </p:grpSpPr>
-      <p:sp>
-        <p:nvSpPr>
-          <p:cNvPr id="170" name="Google Shape;170;p15"/>
-          <p:cNvSpPr txBox="1"/>
-          <p:nvPr>
-            <p:ph type="title"/>
-          </p:nvPr>
-        </p:nvSpPr>
-        <p:spPr>
-          <a:xfrm>
-            <a:off x="415600" y="593367"/>
-            <a:ext cx="11360700" cy="763500"/>
-          </a:xfrm>
-          <a:prstGeom prst="rect">
-            <a:avLst/>
-          </a:prstGeom>
-          <a:noFill/>
-          <a:ln>
-            <a:noFill/>
-          </a:ln>
-        </p:spPr>
-        <p:txBody>
-          <a:bodyPr anchorCtr="0" anchor="t" bIns="45700" lIns="91425" spcFirstLastPara="1" rIns="91425" wrap="square" tIns="45700">
-            <a:noAutofit/>
-          </a:bodyPr>
-          <a:lstStyle/>
-          <a:p>
-            <a:pPr indent="0" lvl="0" marL="0" rtl="0" algn="l">
-              <a:spcBef>
-                <a:spcPts val="0"/>
-              </a:spcBef>
-              <a:spcAft>
-                <a:spcPts val="0"/>
-              </a:spcAft>
-              <a:buClr>
-                <a:schemeClr val="lt2"/>
-              </a:buClr>
-              <a:buSzPts val="4200"/>
-              <a:buFont typeface="Century Gothic"/>
-              <a:buNone/>
-            </a:pPr>
-            <a:r>
-              <a:rPr lang="en-US"/>
-              <a:t>References and Acknowledgments</a:t>
-            </a:r>
-            <a:endParaRPr/>
-          </a:p>
-        </p:txBody>
-      </p:sp>
-      <p:sp>
-        <p:nvSpPr>
-          <p:cNvPr id="171" name="Google Shape;171;p15"/>
+          <p:cNvPr id="175" name="Google Shape;175;p15"/>
           <p:cNvSpPr txBox="1"/>
           <p:nvPr>
             <p:ph idx="1" type="body"/>

</xml_diff>